<commit_message>
Aula 03 - Atualizacao
</commit_message>
<xml_diff>
--- a/Aula03/ED-Aula03.pptx
+++ b/Aula03/ED-Aula03.pptx
@@ -4818,8 +4818,8 @@
         </p:blipFill>
         <p:spPr>
           <a:xfrm>
-            <a:off x="1963847" y="3001246"/>
-            <a:ext cx="4635500" cy="3530600"/>
+            <a:off x="2189017" y="3172746"/>
+            <a:ext cx="4410329" cy="3359100"/>
           </a:xfrm>
           <a:prstGeom prst="rect">
             <a:avLst/>
@@ -5013,8 +5013,8 @@
         </p:blipFill>
         <p:spPr>
           <a:xfrm>
-            <a:off x="1963847" y="3001246"/>
-            <a:ext cx="4635500" cy="3530600"/>
+            <a:off x="2539999" y="3440068"/>
+            <a:ext cx="4059347" cy="3091777"/>
           </a:xfrm>
           <a:prstGeom prst="rect">
             <a:avLst/>
@@ -9114,6 +9114,13 @@
   <p:clrMapOvr>
     <a:masterClrMapping/>
   </p:clrMapOvr>
+  <p:timing>
+    <p:tnLst>
+      <p:par>
+        <p:cTn id="1" dur="indefinite" restart="never" nodeType="tmRoot"/>
+      </p:par>
+    </p:tnLst>
+  </p:timing>
 </p:sld>
 </file>
 
@@ -9515,6 +9522,13 @@
   <p:clrMapOvr>
     <a:masterClrMapping/>
   </p:clrMapOvr>
+  <p:timing>
+    <p:tnLst>
+      <p:par>
+        <p:cTn id="1" dur="indefinite" restart="never" nodeType="tmRoot"/>
+      </p:par>
+    </p:tnLst>
+  </p:timing>
 </p:sld>
 </file>
 
@@ -9597,14 +9611,14 @@
           <p:nvPr>
             <p:extLst>
               <p:ext uri="{D42A27DB-BD31-4B8C-83A1-F6EECF244321}">
-                <p14:modId xmlns:p14="http://schemas.microsoft.com/office/powerpoint/2010/main" val="1191422611"/>
+                <p14:modId xmlns:p14="http://schemas.microsoft.com/office/powerpoint/2010/main" val="4054544111"/>
               </p:ext>
             </p:extLst>
           </p:nvPr>
         </p:nvGraphicFramePr>
         <p:xfrm>
           <a:off x="1190171" y="3537854"/>
-          <a:ext cx="7147977" cy="914400"/>
+          <a:ext cx="7252752" cy="914400"/>
         </p:xfrm>
         <a:graphic>
           <a:graphicData uri="http://schemas.openxmlformats.org/drawingml/2006/table">
@@ -9627,7 +9641,7 @@
                     </a:ext>
                   </a:extLst>
                 </a:gridCol>
-                <a:gridCol w="1617980">
+                <a:gridCol w="1722755">
                   <a:extLst>
                     <a:ext uri="{9D8B030D-6E8A-4147-A177-3AD203B41FA5}">
                       <a16:colId xmlns:a16="http://schemas.microsoft.com/office/drawing/2014/main" val="20002"/>
@@ -9971,6 +9985,13 @@
   <p:clrMapOvr>
     <a:masterClrMapping/>
   </p:clrMapOvr>
+  <p:timing>
+    <p:tnLst>
+      <p:par>
+        <p:cTn id="1" dur="indefinite" restart="never" nodeType="tmRoot"/>
+      </p:par>
+    </p:tnLst>
+  </p:timing>
 </p:sld>
 </file>
 
@@ -10460,6 +10481,13 @@
   <p:clrMapOvr>
     <a:masterClrMapping/>
   </p:clrMapOvr>
+  <p:timing>
+    <p:tnLst>
+      <p:par>
+        <p:cTn id="1" dur="indefinite" restart="never" nodeType="tmRoot"/>
+      </p:par>
+    </p:tnLst>
+  </p:timing>
 </p:sld>
 </file>
 
@@ -10531,7 +10559,11 @@
             </a:r>
             <a:r>
               <a:rPr lang="pt-BR" dirty="0" smtClean="0"/>
-              <a:t>elemento e armazena um dado composto</a:t>
+              <a:t>elemento e armazena um dado </a:t>
+            </a:r>
+            <a:r>
+              <a:rPr lang="pt-BR" dirty="0" smtClean="0"/>
+              <a:t>composto</a:t>
             </a:r>
             <a:endParaRPr lang="pt-BR" dirty="0"/>
           </a:p>
@@ -10874,7 +10906,7 @@
               </a:rPr>
             </a:br>
             <a:r>
-              <a:rPr lang="pt-BR" sz="1200" dirty="0" err="1">
+              <a:rPr lang="pt-BR" sz="1100" dirty="0" err="1">
                 <a:solidFill>
                   <a:schemeClr val="tx1"/>
                 </a:solidFill>
@@ -11029,6 +11061,13 @@
   <p:clrMapOvr>
     <a:masterClrMapping/>
   </p:clrMapOvr>
+  <p:timing>
+    <p:tnLst>
+      <p:par>
+        <p:cTn id="1" dur="indefinite" restart="never" nodeType="tmRoot"/>
+      </p:par>
+    </p:tnLst>
+  </p:timing>
 </p:sld>
 </file>
 

</xml_diff>